<commit_message>
phase diag part 2
</commit_message>
<xml_diff>
--- a/live_site/assets/handouts/09.02_phase_diag.pptx
+++ b/live_site/assets/handouts/09.02_phase_diag.pptx
@@ -2,49 +2,49 @@
 <file path=ppt/presentation.xml><?xml version="1.0" encoding="utf-8"?>
 <p:presentation xmlns:a="http://schemas.openxmlformats.org/drawingml/2006/main" xmlns:r="http://schemas.openxmlformats.org/officeDocument/2006/relationships" xmlns:p="http://schemas.openxmlformats.org/presentationml/2006/main" saveSubsetFonts="1">
   <p:sldMasterIdLst>
-    <p:sldMasterId id="2147483674" r:id="rId3"/>
-    <p:sldMasterId id="2147483686" r:id="rId4"/>
-    <p:sldMasterId id="2147483698" r:id="rId5"/>
+    <p:sldMasterId id="2147483674" r:id="rId4"/>
+    <p:sldMasterId id="2147483686" r:id="rId5"/>
+    <p:sldMasterId id="2147483698" r:id="rId6"/>
   </p:sldMasterIdLst>
   <p:notesMasterIdLst>
-    <p:notesMasterId r:id="rId33"/>
+    <p:notesMasterId r:id="rId34"/>
   </p:notesMasterIdLst>
   <p:handoutMasterIdLst>
-    <p:handoutMasterId r:id="rId34"/>
+    <p:handoutMasterId r:id="rId35"/>
   </p:handoutMasterIdLst>
   <p:sldIdLst>
-    <p:sldId id="559" r:id="rId6"/>
-    <p:sldId id="510" r:id="rId7"/>
-    <p:sldId id="511" r:id="rId8"/>
-    <p:sldId id="512" r:id="rId9"/>
-    <p:sldId id="564" r:id="rId10"/>
-    <p:sldId id="562" r:id="rId11"/>
-    <p:sldId id="513" r:id="rId12"/>
-    <p:sldId id="517" r:id="rId13"/>
-    <p:sldId id="627" r:id="rId14"/>
-    <p:sldId id="589" r:id="rId15"/>
-    <p:sldId id="629" r:id="rId16"/>
-    <p:sldId id="630" r:id="rId17"/>
-    <p:sldId id="628" r:id="rId18"/>
-    <p:sldId id="519" r:id="rId19"/>
-    <p:sldId id="520" r:id="rId20"/>
-    <p:sldId id="521" r:id="rId21"/>
-    <p:sldId id="579" r:id="rId22"/>
-    <p:sldId id="580" r:id="rId23"/>
-    <p:sldId id="581" r:id="rId24"/>
-    <p:sldId id="633" r:id="rId25"/>
-    <p:sldId id="635" r:id="rId26"/>
-    <p:sldId id="631" r:id="rId27"/>
-    <p:sldId id="583" r:id="rId28"/>
-    <p:sldId id="582" r:id="rId29"/>
-    <p:sldId id="584" r:id="rId30"/>
-    <p:sldId id="624" r:id="rId31"/>
-    <p:sldId id="625" r:id="rId32"/>
+    <p:sldId id="559" r:id="rId7"/>
+    <p:sldId id="510" r:id="rId8"/>
+    <p:sldId id="511" r:id="rId9"/>
+    <p:sldId id="512" r:id="rId10"/>
+    <p:sldId id="564" r:id="rId11"/>
+    <p:sldId id="562" r:id="rId12"/>
+    <p:sldId id="513" r:id="rId13"/>
+    <p:sldId id="517" r:id="rId14"/>
+    <p:sldId id="627" r:id="rId15"/>
+    <p:sldId id="589" r:id="rId16"/>
+    <p:sldId id="629" r:id="rId17"/>
+    <p:sldId id="630" r:id="rId18"/>
+    <p:sldId id="628" r:id="rId19"/>
+    <p:sldId id="519" r:id="rId20"/>
+    <p:sldId id="520" r:id="rId21"/>
+    <p:sldId id="521" r:id="rId22"/>
+    <p:sldId id="579" r:id="rId23"/>
+    <p:sldId id="580" r:id="rId24"/>
+    <p:sldId id="581" r:id="rId25"/>
+    <p:sldId id="633" r:id="rId26"/>
+    <p:sldId id="635" r:id="rId27"/>
+    <p:sldId id="631" r:id="rId28"/>
+    <p:sldId id="583" r:id="rId29"/>
+    <p:sldId id="582" r:id="rId30"/>
+    <p:sldId id="584" r:id="rId31"/>
+    <p:sldId id="624" r:id="rId32"/>
+    <p:sldId id="625" r:id="rId33"/>
   </p:sldIdLst>
   <p:sldSz cx="9144000" cy="6858000" type="screen4x3"/>
   <p:notesSz cx="7315200" cy="9601200"/>
   <p:custDataLst>
-    <p:tags r:id="rId35"/>
+    <p:tags r:id="rId36"/>
   </p:custDataLst>
   <p:defaultTextStyle>
     <a:defPPr>
@@ -203,7 +203,7 @@
   <pc:docChgLst>
     <pc:chgData name="Corcoran, Sean" userId="3f12d0a3-3c97-4340-8007-c8fe7e07551f" providerId="ADAL" clId="{8DEA7F4B-EE02-40CD-BB03-9903ACCAA59E}"/>
     <pc:docChg chg="addSld delSld modSld">
-      <pc:chgData name="Corcoran, Sean" userId="3f12d0a3-3c97-4340-8007-c8fe7e07551f" providerId="ADAL" clId="{8DEA7F4B-EE02-40CD-BB03-9903ACCAA59E}" dt="2025-03-28T12:31:09.552" v="2" actId="47"/>
+      <pc:chgData name="Corcoran, Sean" userId="3f12d0a3-3c97-4340-8007-c8fe7e07551f" providerId="ADAL" clId="{8DEA7F4B-EE02-40CD-BB03-9903ACCAA59E}" dt="2025-03-31T18:30:20.846" v="4" actId="1076"/>
       <pc:docMkLst>
         <pc:docMk/>
       </pc:docMkLst>
@@ -221,12 +221,28 @@
           <pc:sldMk cId="3292944403" sldId="511"/>
         </pc:sldMkLst>
       </pc:sldChg>
-      <pc:sldChg chg="add">
-        <pc:chgData name="Corcoran, Sean" userId="3f12d0a3-3c97-4340-8007-c8fe7e07551f" providerId="ADAL" clId="{8DEA7F4B-EE02-40CD-BB03-9903ACCAA59E}" dt="2025-03-28T12:30:48.002" v="0"/>
+      <pc:sldChg chg="modSp add mod">
+        <pc:chgData name="Corcoran, Sean" userId="3f12d0a3-3c97-4340-8007-c8fe7e07551f" providerId="ADAL" clId="{8DEA7F4B-EE02-40CD-BB03-9903ACCAA59E}" dt="2025-03-31T18:30:20.846" v="4" actId="1076"/>
         <pc:sldMkLst>
           <pc:docMk/>
           <pc:sldMk cId="4003562400" sldId="512"/>
         </pc:sldMkLst>
+        <pc:spChg chg="mod">
+          <ac:chgData name="Corcoran, Sean" userId="3f12d0a3-3c97-4340-8007-c8fe7e07551f" providerId="ADAL" clId="{8DEA7F4B-EE02-40CD-BB03-9903ACCAA59E}" dt="2025-03-31T18:30:15.555" v="3" actId="1076"/>
+          <ac:spMkLst>
+            <pc:docMk/>
+            <pc:sldMk cId="4003562400" sldId="512"/>
+            <ac:spMk id="99334" creationId="{00000000-0000-0000-0000-000000000000}"/>
+          </ac:spMkLst>
+        </pc:spChg>
+        <pc:spChg chg="mod">
+          <ac:chgData name="Corcoran, Sean" userId="3f12d0a3-3c97-4340-8007-c8fe7e07551f" providerId="ADAL" clId="{8DEA7F4B-EE02-40CD-BB03-9903ACCAA59E}" dt="2025-03-31T18:30:20.846" v="4" actId="1076"/>
+          <ac:spMkLst>
+            <pc:docMk/>
+            <pc:sldMk cId="4003562400" sldId="512"/>
+            <ac:spMk id="99335" creationId="{00000000-0000-0000-0000-000000000000}"/>
+          </ac:spMkLst>
+        </pc:spChg>
       </pc:sldChg>
       <pc:sldChg chg="add">
         <pc:chgData name="Corcoran, Sean" userId="3f12d0a3-3c97-4340-8007-c8fe7e07551f" providerId="ADAL" clId="{8DEA7F4B-EE02-40CD-BB03-9903ACCAA59E}" dt="2025-03-28T12:30:48.002" v="0"/>
@@ -343,7 +359,7 @@
           <a:p>
             <a:fld id="{2FFC96C0-3BD9-420B-B874-3F2AC6DCC5F5}" type="datetimeFigureOut">
               <a:rPr lang="en-US" smtClean="0"/>
-              <a:t>3/28/2025</a:t>
+              <a:t>3/31/2025</a:t>
             </a:fld>
             <a:endParaRPr lang="en-US"/>
           </a:p>
@@ -18192,7 +18208,7 @@
         </p:nvSpPr>
         <p:spPr bwMode="auto">
           <a:xfrm>
-            <a:off x="685800" y="6096000"/>
+            <a:off x="292994" y="5709857"/>
             <a:ext cx="1295400" cy="396875"/>
           </a:xfrm>
           <a:prstGeom prst="rect">
@@ -18246,7 +18262,7 @@
         </p:nvSpPr>
         <p:spPr bwMode="auto">
           <a:xfrm>
-            <a:off x="4343400" y="6096000"/>
+            <a:off x="4508679" y="5666391"/>
             <a:ext cx="838200" cy="396875"/>
           </a:xfrm>
           <a:prstGeom prst="rect">
@@ -18269,7 +18285,7 @@
           <a:p>
             <a:pPr eaLnBrk="1" hangingPunct="1"/>
             <a:r>
-              <a:rPr lang="en-US" sz="2000" i="0">
+              <a:rPr lang="en-US" sz="2000" i="0" dirty="0">
                 <a:solidFill>
                   <a:srgbClr val="000000"/>
                 </a:solidFill>
@@ -18278,7 +18294,7 @@
               </a:rPr>
               <a:t>Ni </a:t>
             </a:r>
-            <a:endParaRPr lang="en-US" sz="2000" i="0">
+            <a:endParaRPr lang="en-US" sz="2000" i="0" dirty="0">
               <a:solidFill>
                 <a:srgbClr val="000000"/>
               </a:solidFill>
@@ -28783,15 +28799,6 @@
 </file>
 
 <file path=customXml/item2.xml><?xml version="1.0" encoding="utf-8"?>
-<?mso-contentType ?>
-<FormTemplates xmlns="http://schemas.microsoft.com/sharepoint/v3/contenttype/forms">
-  <Display>DocumentLibraryForm</Display>
-  <Edit>DocumentLibraryForm</Edit>
-  <New>DocumentLibraryForm</New>
-</FormTemplates>
-</file>
-
-<file path=customXml/item3.xml><?xml version="1.0" encoding="utf-8"?>
 <p:properties xmlns:p="http://schemas.microsoft.com/office/2006/metadata/properties" xmlns:xsi="http://www.w3.org/2001/XMLSchema-instance" xmlns:pc="http://schemas.microsoft.com/office/infopath/2007/PartnerControls">
   <documentManagement>
     <TaxCatchAll xmlns="0ffa7682-a752-4ec2-9b00-944c9a00bbe9" xsi:nil="true"/>
@@ -28802,18 +28809,49 @@
 </p:properties>
 </file>
 
+<file path=customXml/item3.xml><?xml version="1.0" encoding="utf-8"?>
+<?mso-contentType ?>
+<FormTemplates xmlns="http://schemas.microsoft.com/sharepoint/v3/contenttype/forms">
+  <Display>DocumentLibraryForm</Display>
+  <Edit>DocumentLibraryForm</Edit>
+  <New>DocumentLibraryForm</New>
+</FormTemplates>
+</file>
+
 <file path=customXml/itemProps1.xml><?xml version="1.0" encoding="utf-8"?>
-<ds:datastoreItem xmlns:ds="http://schemas.openxmlformats.org/officeDocument/2006/customXml" ds:itemID="{3DEEE684-40C3-4A69-A7B0-DBDED83697E3}"/>
+<ds:datastoreItem xmlns:ds="http://schemas.openxmlformats.org/officeDocument/2006/customXml" ds:itemID="{3DEEE684-40C3-4A69-A7B0-DBDED83697E3}">
+  <ds:schemaRefs>
+    <ds:schemaRef ds:uri="http://schemas.microsoft.com/office/2006/metadata/contentType"/>
+    <ds:schemaRef ds:uri="http://schemas.microsoft.com/office/2006/metadata/properties/metaAttributes"/>
+    <ds:schemaRef ds:uri="http://www.w3.org/2001/XMLSchema"/>
+    <ds:schemaRef ds:uri="http://schemas.microsoft.com/office/2006/metadata/properties"/>
+    <ds:schemaRef ds:uri="5bbddf2c-15bd-4cee-88ee-4bb358fdb5d4"/>
+    <ds:schemaRef ds:uri="0ffa7682-a752-4ec2-9b00-944c9a00bbe9"/>
+    <ds:schemaRef ds:uri="http://schemas.microsoft.com/office/2006/documentManagement/types"/>
+    <ds:schemaRef ds:uri="http://schemas.microsoft.com/office/infopath/2007/PartnerControls"/>
+    <ds:schemaRef ds:uri="http://schemas.openxmlformats.org/package/2006/metadata/core-properties"/>
+    <ds:schemaRef ds:uri="http://purl.org/dc/elements/1.1/"/>
+    <ds:schemaRef ds:uri="http://purl.org/dc/terms/"/>
+    <ds:schemaRef ds:uri="http://schemas.microsoft.com/internal/obd"/>
+  </ds:schemaRefs>
+</ds:datastoreItem>
 </file>
 
 <file path=customXml/itemProps2.xml><?xml version="1.0" encoding="utf-8"?>
+<ds:datastoreItem xmlns:ds="http://schemas.openxmlformats.org/officeDocument/2006/customXml" ds:itemID="{A894D132-DB31-4891-9385-7A8B34C00766}">
+  <ds:schemaRefs>
+    <ds:schemaRef ds:uri="http://schemas.microsoft.com/office/2006/metadata/properties"/>
+    <ds:schemaRef ds:uri="http://schemas.microsoft.com/office/infopath/2007/PartnerControls"/>
+    <ds:schemaRef ds:uri="0ffa7682-a752-4ec2-9b00-944c9a00bbe9"/>
+    <ds:schemaRef ds:uri="5bbddf2c-15bd-4cee-88ee-4bb358fdb5d4"/>
+  </ds:schemaRefs>
+</ds:datastoreItem>
+</file>
+
+<file path=customXml/itemProps3.xml><?xml version="1.0" encoding="utf-8"?>
 <ds:datastoreItem xmlns:ds="http://schemas.openxmlformats.org/officeDocument/2006/customXml" ds:itemID="{D984693F-E062-42AD-89C8-74ECC6C06529}">
   <ds:schemaRefs>
     <ds:schemaRef ds:uri="http://schemas.microsoft.com/sharepoint/v3/contenttype/forms"/>
   </ds:schemaRefs>
 </ds:datastoreItem>
-</file>
-
-<file path=customXml/itemProps3.xml><?xml version="1.0" encoding="utf-8"?>
-<ds:datastoreItem xmlns:ds="http://schemas.openxmlformats.org/officeDocument/2006/customXml" ds:itemID="{A894D132-DB31-4891-9385-7A8B34C00766}"/>
 </file>
</xml_diff>